<commit_message>
some changes in lec1.pptx
</commit_message>
<xml_diff>
--- a/lec1/lec1.pptx
+++ b/lec1/lec1.pptx
@@ -5,7 +5,7 @@
     <p:sldMasterId id="2147483648" r:id="rId1"/>
   </p:sldMasterIdLst>
   <p:notesMasterIdLst>
-    <p:notesMasterId r:id="rId27"/>
+    <p:notesMasterId r:id="rId28"/>
   </p:notesMasterIdLst>
   <p:sldIdLst>
     <p:sldId id="281" r:id="rId2"/>
@@ -33,6 +33,7 @@
     <p:sldId id="278" r:id="rId24"/>
     <p:sldId id="279" r:id="rId25"/>
     <p:sldId id="280" r:id="rId26"/>
+    <p:sldId id="282" r:id="rId27"/>
   </p:sldIdLst>
   <p:sldSz cx="12192000" cy="6858000"/>
   <p:notesSz cx="6858000" cy="9144000"/>
@@ -131,6 +132,11 @@
       </a:defRPr>
     </a:lvl9pPr>
   </p:defaultTextStyle>
+  <p:extLst>
+    <p:ext uri="{EFAFB233-063F-42B5-8137-9DF3F51BA10A}">
+      <p15:sldGuideLst xmlns:p15="http://schemas.microsoft.com/office/powerpoint/2012/main"/>
+    </p:ext>
+  </p:extLst>
 </p:presentation>
 </file>
 
@@ -366,7 +372,7 @@
                   <c:v>6.311</c:v>
                 </c:pt>
                 <c:pt idx="3">
-                  <c:v>4.16599999999999</c:v>
+                  <c:v>4.165999999999989</c:v>
                 </c:pt>
                 <c:pt idx="4">
                   <c:v>3.92</c:v>
@@ -392,11 +398,11 @@
         </c:dLbls>
         <c:gapWidth val="100"/>
         <c:overlap val="-24"/>
-        <c:axId val="-1984475952"/>
-        <c:axId val="-1983230528"/>
+        <c:axId val="-1980739120"/>
+        <c:axId val="-1980375264"/>
       </c:barChart>
       <c:catAx>
-        <c:axId val="-1984475952"/>
+        <c:axId val="-1980739120"/>
         <c:scaling>
           <c:orientation val="minMax"/>
         </c:scaling>
@@ -439,7 +445,7 @@
             <a:endParaRPr lang="en-US"/>
           </a:p>
         </c:txPr>
-        <c:crossAx val="-1983230528"/>
+        <c:crossAx val="-1980375264"/>
         <c:crosses val="autoZero"/>
         <c:auto val="1"/>
         <c:lblAlgn val="ctr"/>
@@ -447,7 +453,7 @@
         <c:noMultiLvlLbl val="0"/>
       </c:catAx>
       <c:valAx>
-        <c:axId val="-1983230528"/>
+        <c:axId val="-1980375264"/>
         <c:scaling>
           <c:orientation val="minMax"/>
         </c:scaling>
@@ -498,7 +504,7 @@
             <a:endParaRPr lang="en-US"/>
           </a:p>
         </c:txPr>
-        <c:crossAx val="-1984475952"/>
+        <c:crossAx val="-1980739120"/>
         <c:crosses val="autoZero"/>
         <c:crossBetween val="between"/>
       </c:valAx>
@@ -4740,11 +4746,11 @@
   <p:clrMapOvr>
     <a:masterClrMapping/>
   </p:clrMapOvr>
-  <mc:AlternateContent xmlns:mc="http://schemas.openxmlformats.org/markup-compatibility/2006">
-    <mc:Choice xmlns:p14="http://schemas.microsoft.com/office/powerpoint/2010/main" Requires="p14">
+  <mc:AlternateContent xmlns:mc="http://schemas.openxmlformats.org/markup-compatibility/2006" xmlns:p14="http://schemas.microsoft.com/office/powerpoint/2010/main">
+    <mc:Choice Requires="p14">
       <p:transition p14:dur="0"/>
     </mc:Choice>
-    <mc:Fallback>
+    <mc:Fallback xmlns="">
       <p:transition/>
     </mc:Fallback>
   </mc:AlternateContent>
@@ -5264,11 +5270,11 @@
   <p:clrMapOvr>
     <a:masterClrMapping/>
   </p:clrMapOvr>
-  <mc:AlternateContent xmlns:mc="http://schemas.openxmlformats.org/markup-compatibility/2006">
-    <mc:Choice xmlns:p14="http://schemas.microsoft.com/office/powerpoint/2010/main" Requires="p14">
+  <mc:AlternateContent xmlns:mc="http://schemas.openxmlformats.org/markup-compatibility/2006" xmlns:p14="http://schemas.microsoft.com/office/powerpoint/2010/main">
+    <mc:Choice Requires="p14">
       <p:transition p14:dur="0"/>
     </mc:Choice>
-    <mc:Fallback>
+    <mc:Fallback xmlns="">
       <p:transition/>
     </mc:Fallback>
   </mc:AlternateContent>
@@ -5581,11 +5587,11 @@
   <p:clrMapOvr>
     <a:masterClrMapping/>
   </p:clrMapOvr>
-  <mc:AlternateContent xmlns:mc="http://schemas.openxmlformats.org/markup-compatibility/2006">
-    <mc:Choice xmlns:p14="http://schemas.microsoft.com/office/powerpoint/2010/main" Requires="p14">
+  <mc:AlternateContent xmlns:mc="http://schemas.openxmlformats.org/markup-compatibility/2006" xmlns:p14="http://schemas.microsoft.com/office/powerpoint/2010/main">
+    <mc:Choice Requires="p14">
       <p:transition p14:dur="0"/>
     </mc:Choice>
-    <mc:Fallback>
+    <mc:Fallback xmlns="">
       <p:transition/>
     </mc:Fallback>
   </mc:AlternateContent>
@@ -6613,11 +6619,11 @@
   <p:clrMapOvr>
     <a:masterClrMapping/>
   </p:clrMapOvr>
-  <mc:AlternateContent xmlns:mc="http://schemas.openxmlformats.org/markup-compatibility/2006">
-    <mc:Choice xmlns:p14="http://schemas.microsoft.com/office/powerpoint/2010/main" Requires="p14">
+  <mc:AlternateContent xmlns:mc="http://schemas.openxmlformats.org/markup-compatibility/2006" xmlns:p14="http://schemas.microsoft.com/office/powerpoint/2010/main">
+    <mc:Choice Requires="p14">
       <p:transition p14:dur="0"/>
     </mc:Choice>
-    <mc:Fallback>
+    <mc:Fallback xmlns="">
       <p:transition/>
     </mc:Fallback>
   </mc:AlternateContent>
@@ -7385,11 +7391,11 @@
   <p:clrMapOvr>
     <a:masterClrMapping/>
   </p:clrMapOvr>
-  <mc:AlternateContent xmlns:mc="http://schemas.openxmlformats.org/markup-compatibility/2006">
-    <mc:Choice xmlns:p14="http://schemas.microsoft.com/office/powerpoint/2010/main" Requires="p14">
+  <mc:AlternateContent xmlns:mc="http://schemas.openxmlformats.org/markup-compatibility/2006" xmlns:p14="http://schemas.microsoft.com/office/powerpoint/2010/main">
+    <mc:Choice Requires="p14">
       <p:transition p14:dur="0"/>
     </mc:Choice>
-    <mc:Fallback>
+    <mc:Fallback xmlns="">
       <p:transition/>
     </mc:Fallback>
   </mc:AlternateContent>
@@ -9080,11 +9086,11 @@
   <p:clrMapOvr>
     <a:masterClrMapping/>
   </p:clrMapOvr>
-  <mc:AlternateContent xmlns:mc="http://schemas.openxmlformats.org/markup-compatibility/2006">
-    <mc:Choice xmlns:p14="http://schemas.microsoft.com/office/powerpoint/2010/main" Requires="p14">
+  <mc:AlternateContent xmlns:mc="http://schemas.openxmlformats.org/markup-compatibility/2006" xmlns:p14="http://schemas.microsoft.com/office/powerpoint/2010/main">
+    <mc:Choice Requires="p14">
       <p:transition p14:dur="0"/>
     </mc:Choice>
-    <mc:Fallback>
+    <mc:Fallback xmlns="">
       <p:transition/>
     </mc:Fallback>
   </mc:AlternateContent>
@@ -9474,11 +9480,11 @@
   <p:clrMapOvr>
     <a:masterClrMapping/>
   </p:clrMapOvr>
-  <mc:AlternateContent xmlns:mc="http://schemas.openxmlformats.org/markup-compatibility/2006">
-    <mc:Choice xmlns:p14="http://schemas.microsoft.com/office/powerpoint/2010/main" Requires="p14">
+  <mc:AlternateContent xmlns:mc="http://schemas.openxmlformats.org/markup-compatibility/2006" xmlns:p14="http://schemas.microsoft.com/office/powerpoint/2010/main">
+    <mc:Choice Requires="p14">
       <p:transition p14:dur="0"/>
     </mc:Choice>
-    <mc:Fallback>
+    <mc:Fallback xmlns="">
       <p:transition/>
     </mc:Fallback>
   </mc:AlternateContent>
@@ -10242,11 +10248,11 @@
   <p:clrMapOvr>
     <a:masterClrMapping/>
   </p:clrMapOvr>
-  <mc:AlternateContent xmlns:mc="http://schemas.openxmlformats.org/markup-compatibility/2006">
-    <mc:Choice xmlns:p14="http://schemas.microsoft.com/office/powerpoint/2010/main" Requires="p14">
+  <mc:AlternateContent xmlns:mc="http://schemas.openxmlformats.org/markup-compatibility/2006" xmlns:p14="http://schemas.microsoft.com/office/powerpoint/2010/main">
+    <mc:Choice Requires="p14">
       <p:transition p14:dur="0"/>
     </mc:Choice>
-    <mc:Fallback>
+    <mc:Fallback xmlns="">
       <p:transition/>
     </mc:Fallback>
   </mc:AlternateContent>
@@ -10442,13 +10448,6 @@
                 </a:rPr>
                 <a:t>0</a:t>
               </a:r>
-              <a:endParaRPr lang="en-US" dirty="0">
-                <a:solidFill>
-                  <a:schemeClr val="accent2">
-                    <a:lumMod val="50000"/>
-                  </a:schemeClr>
-                </a:solidFill>
-              </a:endParaRPr>
             </a:p>
           </p:txBody>
         </p:sp>
@@ -10868,13 +10867,6 @@
                 </a:rPr>
                 <a:t>0</a:t>
               </a:r>
-              <a:endParaRPr lang="en-US" dirty="0">
-                <a:solidFill>
-                  <a:schemeClr val="accent2">
-                    <a:lumMod val="50000"/>
-                  </a:schemeClr>
-                </a:solidFill>
-              </a:endParaRPr>
             </a:p>
           </p:txBody>
         </p:sp>
@@ -10927,13 +10919,6 @@
                 </a:rPr>
                 <a:t>0</a:t>
               </a:r>
-              <a:endParaRPr lang="en-US" dirty="0">
-                <a:solidFill>
-                  <a:schemeClr val="accent2">
-                    <a:lumMod val="50000"/>
-                  </a:schemeClr>
-                </a:solidFill>
-              </a:endParaRPr>
             </a:p>
           </p:txBody>
         </p:sp>
@@ -11410,13 +11395,6 @@
                 </a:rPr>
                 <a:t>0</a:t>
               </a:r>
-              <a:endParaRPr lang="en-US" dirty="0">
-                <a:solidFill>
-                  <a:schemeClr val="accent2">
-                    <a:lumMod val="50000"/>
-                  </a:schemeClr>
-                </a:solidFill>
-              </a:endParaRPr>
             </a:p>
           </p:txBody>
         </p:sp>
@@ -11469,13 +11447,6 @@
                 </a:rPr>
                 <a:t>0</a:t>
               </a:r>
-              <a:endParaRPr lang="en-US" dirty="0">
-                <a:solidFill>
-                  <a:schemeClr val="accent2">
-                    <a:lumMod val="50000"/>
-                  </a:schemeClr>
-                </a:solidFill>
-              </a:endParaRPr>
             </a:p>
           </p:txBody>
         </p:sp>
@@ -12219,13 +12190,6 @@
                 </a:rPr>
                 <a:t>0</a:t>
               </a:r>
-              <a:endParaRPr lang="en-US" dirty="0">
-                <a:solidFill>
-                  <a:schemeClr val="accent2">
-                    <a:lumMod val="50000"/>
-                  </a:schemeClr>
-                </a:solidFill>
-              </a:endParaRPr>
             </a:p>
           </p:txBody>
         </p:sp>
@@ -12645,13 +12609,6 @@
                 </a:rPr>
                 <a:t>0</a:t>
               </a:r>
-              <a:endParaRPr lang="en-US" dirty="0">
-                <a:solidFill>
-                  <a:schemeClr val="accent2">
-                    <a:lumMod val="50000"/>
-                  </a:schemeClr>
-                </a:solidFill>
-              </a:endParaRPr>
             </a:p>
           </p:txBody>
         </p:sp>
@@ -12704,13 +12661,6 @@
                 </a:rPr>
                 <a:t>0</a:t>
               </a:r>
-              <a:endParaRPr lang="en-US" dirty="0">
-                <a:solidFill>
-                  <a:schemeClr val="accent2">
-                    <a:lumMod val="50000"/>
-                  </a:schemeClr>
-                </a:solidFill>
-              </a:endParaRPr>
             </a:p>
           </p:txBody>
         </p:sp>
@@ -13249,13 +13199,6 @@
                 </a:rPr>
                 <a:t>0</a:t>
               </a:r>
-              <a:endParaRPr lang="en-US" dirty="0">
-                <a:solidFill>
-                  <a:schemeClr val="accent2">
-                    <a:lumMod val="50000"/>
-                  </a:schemeClr>
-                </a:solidFill>
-              </a:endParaRPr>
             </a:p>
           </p:txBody>
         </p:sp>
@@ -14101,11 +14044,11 @@
   <p:clrMapOvr>
     <a:masterClrMapping/>
   </p:clrMapOvr>
-  <mc:AlternateContent xmlns:mc="http://schemas.openxmlformats.org/markup-compatibility/2006">
-    <mc:Choice xmlns:p14="http://schemas.microsoft.com/office/powerpoint/2010/main" Requires="p14">
+  <mc:AlternateContent xmlns:mc="http://schemas.openxmlformats.org/markup-compatibility/2006" xmlns:p14="http://schemas.microsoft.com/office/powerpoint/2010/main">
+    <mc:Choice Requires="p14">
       <p:transition p14:dur="0"/>
     </mc:Choice>
-    <mc:Fallback>
+    <mc:Fallback xmlns="">
       <p:transition/>
     </mc:Fallback>
   </mc:AlternateContent>
@@ -14301,13 +14244,6 @@
                 </a:rPr>
                 <a:t>0</a:t>
               </a:r>
-              <a:endParaRPr lang="en-US" dirty="0">
-                <a:solidFill>
-                  <a:schemeClr val="accent2">
-                    <a:lumMod val="50000"/>
-                  </a:schemeClr>
-                </a:solidFill>
-              </a:endParaRPr>
             </a:p>
           </p:txBody>
         </p:sp>
@@ -14727,13 +14663,6 @@
                 </a:rPr>
                 <a:t>0</a:t>
               </a:r>
-              <a:endParaRPr lang="en-US" dirty="0">
-                <a:solidFill>
-                  <a:schemeClr val="accent2">
-                    <a:lumMod val="50000"/>
-                  </a:schemeClr>
-                </a:solidFill>
-              </a:endParaRPr>
             </a:p>
           </p:txBody>
         </p:sp>
@@ -14786,13 +14715,6 @@
                 </a:rPr>
                 <a:t>0</a:t>
               </a:r>
-              <a:endParaRPr lang="en-US" dirty="0">
-                <a:solidFill>
-                  <a:schemeClr val="accent2">
-                    <a:lumMod val="50000"/>
-                  </a:schemeClr>
-                </a:solidFill>
-              </a:endParaRPr>
             </a:p>
           </p:txBody>
         </p:sp>
@@ -15336,13 +15258,6 @@
                 </a:rPr>
                 <a:t>0</a:t>
               </a:r>
-              <a:endParaRPr lang="en-US" dirty="0">
-                <a:solidFill>
-                  <a:schemeClr val="accent2">
-                    <a:lumMod val="50000"/>
-                  </a:schemeClr>
-                </a:solidFill>
-              </a:endParaRPr>
             </a:p>
           </p:txBody>
         </p:sp>
@@ -16095,13 +16010,6 @@
                 </a:rPr>
                 <a:t>0</a:t>
               </a:r>
-              <a:endParaRPr lang="en-US" dirty="0">
-                <a:solidFill>
-                  <a:schemeClr val="accent2">
-                    <a:lumMod val="50000"/>
-                  </a:schemeClr>
-                </a:solidFill>
-              </a:endParaRPr>
             </a:p>
           </p:txBody>
         </p:sp>
@@ -16521,13 +16429,6 @@
                 </a:rPr>
                 <a:t>0</a:t>
               </a:r>
-              <a:endParaRPr lang="en-US" dirty="0">
-                <a:solidFill>
-                  <a:schemeClr val="accent2">
-                    <a:lumMod val="50000"/>
-                  </a:schemeClr>
-                </a:solidFill>
-              </a:endParaRPr>
             </a:p>
           </p:txBody>
         </p:sp>
@@ -16580,13 +16481,6 @@
                 </a:rPr>
                 <a:t>0</a:t>
               </a:r>
-              <a:endParaRPr lang="en-US" dirty="0">
-                <a:solidFill>
-                  <a:schemeClr val="accent2">
-                    <a:lumMod val="50000"/>
-                  </a:schemeClr>
-                </a:solidFill>
-              </a:endParaRPr>
             </a:p>
           </p:txBody>
         </p:sp>
@@ -17315,11 +17209,6 @@
               </a:rPr>
               <a:t>b = a &gt;&gt; 2;</a:t>
             </a:r>
-            <a:endParaRPr lang="en-US" dirty="0">
-              <a:latin typeface="Lucida Console" charset="0"/>
-              <a:ea typeface="Lucida Console" charset="0"/>
-              <a:cs typeface="Lucida Console" charset="0"/>
-            </a:endParaRPr>
           </a:p>
         </p:txBody>
       </p:sp>
@@ -17431,11 +17320,11 @@
   <p:clrMapOvr>
     <a:masterClrMapping/>
   </p:clrMapOvr>
-  <mc:AlternateContent xmlns:mc="http://schemas.openxmlformats.org/markup-compatibility/2006">
-    <mc:Choice xmlns:p14="http://schemas.microsoft.com/office/powerpoint/2010/main" Requires="p14">
+  <mc:AlternateContent xmlns:mc="http://schemas.openxmlformats.org/markup-compatibility/2006" xmlns:p14="http://schemas.microsoft.com/office/powerpoint/2010/main">
+    <mc:Choice Requires="p14">
       <p:transition p14:dur="0"/>
     </mc:Choice>
-    <mc:Fallback>
+    <mc:Fallback xmlns="">
       <p:transition/>
     </mc:Fallback>
   </mc:AlternateContent>
@@ -17631,13 +17520,6 @@
                 </a:rPr>
                 <a:t>0</a:t>
               </a:r>
-              <a:endParaRPr lang="en-US" dirty="0">
-                <a:solidFill>
-                  <a:schemeClr val="accent2">
-                    <a:lumMod val="50000"/>
-                  </a:schemeClr>
-                </a:solidFill>
-              </a:endParaRPr>
             </a:p>
           </p:txBody>
         </p:sp>
@@ -18485,13 +18367,6 @@
               </a:rPr>
               <a:t>0</a:t>
             </a:r>
-            <a:endParaRPr lang="en-US" dirty="0">
-              <a:solidFill>
-                <a:schemeClr val="accent2">
-                  <a:lumMod val="50000"/>
-                </a:schemeClr>
-              </a:solidFill>
-            </a:endParaRPr>
           </a:p>
         </p:txBody>
       </p:sp>
@@ -18842,6 +18717,80 @@
           </a:p>
         </p:txBody>
       </p:sp>
+      <p:sp>
+        <p:nvSpPr>
+          <p:cNvPr id="5" name="TextBox 4"/>
+          <p:cNvSpPr txBox="1"/>
+          <p:nvPr/>
+        </p:nvSpPr>
+        <p:spPr>
+          <a:xfrm>
+            <a:off x="5154075" y="6365875"/>
+            <a:ext cx="2138727" cy="261610"/>
+          </a:xfrm>
+          <a:prstGeom prst="rect">
+            <a:avLst/>
+          </a:prstGeom>
+          <a:noFill/>
+        </p:spPr>
+        <p:txBody>
+          <a:bodyPr wrap="none" rtlCol="0">
+            <a:spAutoFit/>
+          </a:bodyPr>
+          <a:lstStyle/>
+          <a:p>
+            <a:r>
+              <a:rPr lang="en-US" sz="1100" dirty="0" smtClean="0">
+                <a:solidFill>
+                  <a:schemeClr val="accent2">
+                    <a:lumMod val="75000"/>
+                  </a:schemeClr>
+                </a:solidFill>
+                <a:latin typeface="Lucida Console" charset="0"/>
+                <a:ea typeface="Lucida Console" charset="0"/>
+                <a:cs typeface="Lucida Console" charset="0"/>
+              </a:rPr>
+              <a:t>Files: </a:t>
+            </a:r>
+            <a:r>
+              <a:rPr lang="en-US" sz="1100" dirty="0" err="1" smtClean="0">
+                <a:solidFill>
+                  <a:schemeClr val="accent2">
+                    <a:lumMod val="75000"/>
+                  </a:schemeClr>
+                </a:solidFill>
+                <a:latin typeface="Lucida Console" charset="0"/>
+                <a:ea typeface="Lucida Console" charset="0"/>
+                <a:cs typeface="Lucida Console" charset="0"/>
+              </a:rPr>
+              <a:t>bitwise.c</a:t>
+            </a:r>
+            <a:r>
+              <a:rPr lang="en-US" sz="1100" dirty="0" smtClean="0">
+                <a:solidFill>
+                  <a:schemeClr val="accent2">
+                    <a:lumMod val="75000"/>
+                  </a:schemeClr>
+                </a:solidFill>
+                <a:latin typeface="Lucida Console" charset="0"/>
+                <a:ea typeface="Lucida Console" charset="0"/>
+                <a:cs typeface="Lucida Console" charset="0"/>
+              </a:rPr>
+              <a:t>       </a:t>
+            </a:r>
+            <a:endParaRPr lang="en-US" sz="1100" dirty="0">
+              <a:solidFill>
+                <a:schemeClr val="accent2">
+                  <a:lumMod val="75000"/>
+                </a:schemeClr>
+              </a:solidFill>
+              <a:latin typeface="Lucida Console" charset="0"/>
+              <a:ea typeface="Lucida Console" charset="0"/>
+              <a:cs typeface="Lucida Console" charset="0"/>
+            </a:endParaRPr>
+          </a:p>
+        </p:txBody>
+      </p:sp>
     </p:spTree>
     <p:extLst>
       <p:ext uri="{BB962C8B-B14F-4D97-AF65-F5344CB8AC3E}">
@@ -19298,11 +19247,11 @@
   <p:clrMapOvr>
     <a:masterClrMapping/>
   </p:clrMapOvr>
-  <mc:AlternateContent xmlns:mc="http://schemas.openxmlformats.org/markup-compatibility/2006">
-    <mc:Choice xmlns:p14="http://schemas.microsoft.com/office/powerpoint/2010/main" Requires="p14">
+  <mc:AlternateContent xmlns:mc="http://schemas.openxmlformats.org/markup-compatibility/2006" xmlns:p14="http://schemas.microsoft.com/office/powerpoint/2010/main">
+    <mc:Choice Requires="p14">
       <p:transition p14:dur="0"/>
     </mc:Choice>
-    <mc:Fallback>
+    <mc:Fallback xmlns="">
       <p:transition/>
     </mc:Fallback>
   </mc:AlternateContent>
@@ -20180,6 +20129,240 @@
 </p:sld>
 </file>
 
+<file path=ppt/slides/slide26.xml><?xml version="1.0" encoding="utf-8"?>
+<p:sld xmlns:a="http://schemas.openxmlformats.org/drawingml/2006/main" xmlns:r="http://schemas.openxmlformats.org/officeDocument/2006/relationships" xmlns:p="http://schemas.openxmlformats.org/presentationml/2006/main">
+  <p:cSld>
+    <p:spTree>
+      <p:nvGrpSpPr>
+        <p:cNvPr id="1" name=""/>
+        <p:cNvGrpSpPr/>
+        <p:nvPr/>
+      </p:nvGrpSpPr>
+      <p:grpSpPr>
+        <a:xfrm>
+          <a:off x="0" y="0"/>
+          <a:ext cx="0" cy="0"/>
+          <a:chOff x="0" y="0"/>
+          <a:chExt cx="0" cy="0"/>
+        </a:xfrm>
+      </p:grpSpPr>
+      <p:sp>
+        <p:nvSpPr>
+          <p:cNvPr id="2" name="Title 1"/>
+          <p:cNvSpPr>
+            <a:spLocks noGrp="1"/>
+          </p:cNvSpPr>
+          <p:nvPr>
+            <p:ph type="title"/>
+          </p:nvPr>
+        </p:nvSpPr>
+        <p:spPr/>
+        <p:txBody>
+          <a:bodyPr>
+            <a:normAutofit/>
+          </a:bodyPr>
+          <a:lstStyle/>
+          <a:p>
+            <a:r>
+              <a:rPr lang="ru-RU" dirty="0" smtClean="0"/>
+              <a:t>Задания</a:t>
+            </a:r>
+            <a:br>
+              <a:rPr lang="ru-RU" dirty="0" smtClean="0"/>
+            </a:br>
+            <a:r>
+              <a:rPr lang="ru-RU" dirty="0" smtClean="0"/>
+              <a:t>------------------------------------------------------------</a:t>
+            </a:r>
+            <a:endParaRPr lang="en-US" dirty="0"/>
+          </a:p>
+        </p:txBody>
+      </p:sp>
+      <p:sp>
+        <p:nvSpPr>
+          <p:cNvPr id="4" name="TextBox 3"/>
+          <p:cNvSpPr txBox="1"/>
+          <p:nvPr/>
+        </p:nvSpPr>
+        <p:spPr>
+          <a:xfrm>
+            <a:off x="2604440" y="3143250"/>
+            <a:ext cx="8477257" cy="1477328"/>
+          </a:xfrm>
+          <a:prstGeom prst="rect">
+            <a:avLst/>
+          </a:prstGeom>
+          <a:noFill/>
+        </p:spPr>
+        <p:txBody>
+          <a:bodyPr wrap="none" rtlCol="0">
+            <a:spAutoFit/>
+          </a:bodyPr>
+          <a:lstStyle/>
+          <a:p>
+            <a:pPr marL="342900" indent="-342900">
+              <a:buAutoNum type="arabicPeriod"/>
+            </a:pPr>
+            <a:r>
+              <a:rPr lang="ru-RU" dirty="0" smtClean="0"/>
+              <a:t>Вывести </a:t>
+            </a:r>
+            <a:r>
+              <a:rPr lang="en-US" dirty="0" smtClean="0"/>
+              <a:t>Hello, &lt;</a:t>
+            </a:r>
+            <a:r>
+              <a:rPr lang="ru-RU" dirty="0" err="1" smtClean="0"/>
+              <a:t>Ваше_Имя</a:t>
+            </a:r>
+            <a:r>
+              <a:rPr lang="en-US" dirty="0" smtClean="0"/>
+              <a:t>&gt;, </a:t>
+            </a:r>
+            <a:r>
+              <a:rPr lang="ru-RU" dirty="0" smtClean="0"/>
+              <a:t>вывести последовательность </a:t>
+            </a:r>
+            <a:r>
+              <a:rPr lang="en-US" dirty="0" smtClean="0"/>
+              <a:t>”\n”</a:t>
+            </a:r>
+            <a:endParaRPr lang="ru-RU" dirty="0" smtClean="0"/>
+          </a:p>
+          <a:p>
+            <a:pPr marL="342900" indent="-342900">
+              <a:buAutoNum type="arabicPeriod"/>
+            </a:pPr>
+            <a:r>
+              <a:rPr lang="ru-RU" dirty="0" smtClean="0"/>
+              <a:t>Вывести любое число типа </a:t>
+            </a:r>
+            <a:r>
+              <a:rPr lang="en-US" dirty="0" err="1" smtClean="0">
+                <a:solidFill>
+                  <a:schemeClr val="accent2">
+                    <a:lumMod val="75000"/>
+                  </a:schemeClr>
+                </a:solidFill>
+              </a:rPr>
+              <a:t>int</a:t>
+            </a:r>
+            <a:r>
+              <a:rPr lang="en-US" dirty="0" smtClean="0">
+                <a:solidFill>
+                  <a:schemeClr val="accent2">
+                    <a:lumMod val="75000"/>
+                  </a:schemeClr>
+                </a:solidFill>
+              </a:rPr>
+              <a:t> </a:t>
+            </a:r>
+            <a:r>
+              <a:rPr lang="ru-RU" dirty="0" smtClean="0"/>
+              <a:t>как </a:t>
+            </a:r>
+            <a:r>
+              <a:rPr lang="en-US" dirty="0" smtClean="0">
+                <a:solidFill>
+                  <a:schemeClr val="accent2">
+                    <a:lumMod val="75000"/>
+                  </a:schemeClr>
+                </a:solidFill>
+              </a:rPr>
+              <a:t>float</a:t>
+            </a:r>
+            <a:r>
+              <a:rPr lang="ru-RU" dirty="0" smtClean="0"/>
+              <a:t>. Вывести число -1 типа </a:t>
+            </a:r>
+            <a:r>
+              <a:rPr lang="en-US" dirty="0" err="1" smtClean="0">
+                <a:solidFill>
+                  <a:schemeClr val="accent2">
+                    <a:lumMod val="75000"/>
+                  </a:schemeClr>
+                </a:solidFill>
+              </a:rPr>
+              <a:t>int</a:t>
+            </a:r>
+            <a:r>
+              <a:rPr lang="en-US" dirty="0" smtClean="0">
+                <a:solidFill>
+                  <a:schemeClr val="accent2">
+                    <a:lumMod val="75000"/>
+                  </a:schemeClr>
+                </a:solidFill>
+              </a:rPr>
+              <a:t> </a:t>
+            </a:r>
+            <a:r>
+              <a:rPr lang="ru-RU" dirty="0" smtClean="0"/>
+              <a:t>как </a:t>
+            </a:r>
+            <a:r>
+              <a:rPr lang="en-US" dirty="0" smtClean="0">
+                <a:solidFill>
+                  <a:schemeClr val="accent2">
+                    <a:lumMod val="75000"/>
+                  </a:schemeClr>
+                </a:solidFill>
+              </a:rPr>
+              <a:t>unsigned</a:t>
+            </a:r>
+            <a:r>
+              <a:rPr lang="en-US" dirty="0" smtClean="0"/>
+              <a:t>.</a:t>
+            </a:r>
+            <a:endParaRPr lang="ru-RU" dirty="0" smtClean="0"/>
+          </a:p>
+          <a:p>
+            <a:pPr marL="342900" indent="-342900">
+              <a:buAutoNum type="arabicPeriod"/>
+            </a:pPr>
+            <a:r>
+              <a:rPr lang="ru-RU" dirty="0"/>
+              <a:t>Узнать сколько занимает байт занимают базовые типы Си на вашей </a:t>
+            </a:r>
+            <a:r>
+              <a:rPr lang="ru-RU" dirty="0" smtClean="0"/>
+              <a:t>ОС</a:t>
+            </a:r>
+            <a:r>
+              <a:rPr lang="en-US" dirty="0"/>
+              <a:t>;</a:t>
+            </a:r>
+            <a:endParaRPr lang="ru-RU" dirty="0" smtClean="0"/>
+          </a:p>
+          <a:p>
+            <a:pPr marL="342900" indent="-342900">
+              <a:buAutoNum type="arabicPeriod"/>
+            </a:pPr>
+            <a:r>
+              <a:rPr lang="ru-RU" dirty="0" smtClean="0"/>
+              <a:t>Написать программу для перевода введенной цифры в символ</a:t>
+            </a:r>
+          </a:p>
+          <a:p>
+            <a:pPr marL="342900" indent="-342900">
+              <a:buAutoNum type="arabicPeriod"/>
+            </a:pPr>
+            <a:endParaRPr lang="en-US" dirty="0"/>
+          </a:p>
+        </p:txBody>
+      </p:sp>
+    </p:spTree>
+    <p:extLst>
+      <p:ext uri="{BB962C8B-B14F-4D97-AF65-F5344CB8AC3E}">
+        <p14:creationId xmlns:p14="http://schemas.microsoft.com/office/powerpoint/2010/main" val="1348688548"/>
+      </p:ext>
+    </p:extLst>
+  </p:cSld>
+  <p:clrMapOvr>
+    <a:masterClrMapping/>
+  </p:clrMapOvr>
+</p:sld>
+</file>
+
 <file path=ppt/slides/slide3.xml><?xml version="1.0" encoding="utf-8"?>
 <p:sld xmlns:a="http://schemas.openxmlformats.org/drawingml/2006/main" xmlns:r="http://schemas.openxmlformats.org/officeDocument/2006/relationships" xmlns:p="http://schemas.openxmlformats.org/presentationml/2006/main">
   <p:cSld>
@@ -20347,11 +20530,11 @@
   <p:clrMapOvr>
     <a:masterClrMapping/>
   </p:clrMapOvr>
-  <mc:AlternateContent xmlns:mc="http://schemas.openxmlformats.org/markup-compatibility/2006">
-    <mc:Choice xmlns:p14="http://schemas.microsoft.com/office/powerpoint/2010/main" Requires="p14">
+  <mc:AlternateContent xmlns:mc="http://schemas.openxmlformats.org/markup-compatibility/2006" xmlns:p14="http://schemas.microsoft.com/office/powerpoint/2010/main">
+    <mc:Choice Requires="p14">
       <p:transition p14:dur="0"/>
     </mc:Choice>
-    <mc:Fallback>
+    <mc:Fallback xmlns="">
       <p:transition/>
     </mc:Fallback>
   </mc:AlternateContent>
@@ -21550,11 +21733,11 @@
   <p:clrMapOvr>
     <a:masterClrMapping/>
   </p:clrMapOvr>
-  <mc:AlternateContent xmlns:mc="http://schemas.openxmlformats.org/markup-compatibility/2006">
-    <mc:Choice xmlns:p14="http://schemas.microsoft.com/office/powerpoint/2010/main" Requires="p14">
+  <mc:AlternateContent xmlns:mc="http://schemas.openxmlformats.org/markup-compatibility/2006" xmlns:p14="http://schemas.microsoft.com/office/powerpoint/2010/main">
+    <mc:Choice Requires="p14">
       <p:transition p14:dur="0"/>
     </mc:Choice>
-    <mc:Fallback>
+    <mc:Fallback xmlns="">
       <p:transition/>
     </mc:Fallback>
   </mc:AlternateContent>
@@ -22655,11 +22838,11 @@
   <p:clrMapOvr>
     <a:masterClrMapping/>
   </p:clrMapOvr>
-  <mc:AlternateContent xmlns:mc="http://schemas.openxmlformats.org/markup-compatibility/2006">
-    <mc:Choice xmlns:p14="http://schemas.microsoft.com/office/powerpoint/2010/main" Requires="p14">
+  <mc:AlternateContent xmlns:mc="http://schemas.openxmlformats.org/markup-compatibility/2006" xmlns:p14="http://schemas.microsoft.com/office/powerpoint/2010/main">
+    <mc:Choice Requires="p14">
       <p:transition p14:dur="0"/>
     </mc:Choice>
-    <mc:Fallback>
+    <mc:Fallback xmlns="">
       <p:transition/>
     </mc:Fallback>
   </mc:AlternateContent>
@@ -22859,11 +23042,11 @@
   <p:clrMapOvr>
     <a:masterClrMapping/>
   </p:clrMapOvr>
-  <mc:AlternateContent xmlns:mc="http://schemas.openxmlformats.org/markup-compatibility/2006">
-    <mc:Choice xmlns:p14="http://schemas.microsoft.com/office/powerpoint/2010/main" Requires="p14">
+  <mc:AlternateContent xmlns:mc="http://schemas.openxmlformats.org/markup-compatibility/2006" xmlns:p14="http://schemas.microsoft.com/office/powerpoint/2010/main">
+    <mc:Choice Requires="p14">
       <p:transition p14:dur="0"/>
     </mc:Choice>
-    <mc:Fallback>
+    <mc:Fallback xmlns="">
       <p:transition/>
     </mc:Fallback>
   </mc:AlternateContent>
@@ -23538,11 +23721,11 @@
   <p:clrMapOvr>
     <a:masterClrMapping/>
   </p:clrMapOvr>
-  <mc:AlternateContent xmlns:mc="http://schemas.openxmlformats.org/markup-compatibility/2006">
-    <mc:Choice xmlns:p14="http://schemas.microsoft.com/office/powerpoint/2010/main" Requires="p14">
+  <mc:AlternateContent xmlns:mc="http://schemas.openxmlformats.org/markup-compatibility/2006" xmlns:p14="http://schemas.microsoft.com/office/powerpoint/2010/main">
+    <mc:Choice Requires="p14">
       <p:transition p14:dur="0"/>
     </mc:Choice>
-    <mc:Fallback>
+    <mc:Fallback xmlns="">
       <p:transition/>
     </mc:Fallback>
   </mc:AlternateContent>
@@ -24309,11 +24492,11 @@
   <p:clrMapOvr>
     <a:masterClrMapping/>
   </p:clrMapOvr>
-  <mc:AlternateContent xmlns:mc="http://schemas.openxmlformats.org/markup-compatibility/2006">
-    <mc:Choice xmlns:p14="http://schemas.microsoft.com/office/powerpoint/2010/main" Requires="p14">
+  <mc:AlternateContent xmlns:mc="http://schemas.openxmlformats.org/markup-compatibility/2006" xmlns:p14="http://schemas.microsoft.com/office/powerpoint/2010/main">
+    <mc:Choice Requires="p14">
       <p:transition p14:dur="0"/>
     </mc:Choice>
-    <mc:Fallback>
+    <mc:Fallback xmlns="">
       <p:transition/>
     </mc:Fallback>
   </mc:AlternateContent>
@@ -25163,11 +25346,11 @@
   <p:clrMapOvr>
     <a:masterClrMapping/>
   </p:clrMapOvr>
-  <mc:AlternateContent xmlns:mc="http://schemas.openxmlformats.org/markup-compatibility/2006">
-    <mc:Choice xmlns:p14="http://schemas.microsoft.com/office/powerpoint/2010/main" Requires="p14">
+  <mc:AlternateContent xmlns:mc="http://schemas.openxmlformats.org/markup-compatibility/2006" xmlns:p14="http://schemas.microsoft.com/office/powerpoint/2010/main">
+    <mc:Choice Requires="p14">
       <p:transition p14:dur="0"/>
     </mc:Choice>
-    <mc:Fallback>
+    <mc:Fallback xmlns="">
       <p:transition/>
     </mc:Fallback>
   </mc:AlternateContent>

</xml_diff>

<commit_message>
add 3, 4 lec
</commit_message>
<xml_diff>
--- a/lec1/lec1.pptx
+++ b/lec1/lec1.pptx
@@ -373,7 +373,7 @@
                   <c:v>6.311</c:v>
                 </c:pt>
                 <c:pt idx="3">
-                  <c:v>4.165999999999987</c:v>
+                  <c:v>4.165999999999986</c:v>
                 </c:pt>
                 <c:pt idx="4">
                   <c:v>3.92</c:v>
@@ -399,11 +399,11 @@
         </c:dLbls>
         <c:gapWidth val="100"/>
         <c:overlap val="-24"/>
-        <c:axId val="816000496"/>
-        <c:axId val="900701456"/>
+        <c:axId val="657476528"/>
+        <c:axId val="577663616"/>
       </c:barChart>
       <c:catAx>
-        <c:axId val="816000496"/>
+        <c:axId val="657476528"/>
         <c:scaling>
           <c:orientation val="minMax"/>
         </c:scaling>
@@ -446,7 +446,7 @@
             <a:endParaRPr lang="en-US"/>
           </a:p>
         </c:txPr>
-        <c:crossAx val="900701456"/>
+        <c:crossAx val="577663616"/>
         <c:crosses val="autoZero"/>
         <c:auto val="1"/>
         <c:lblAlgn val="ctr"/>
@@ -454,7 +454,7 @@
         <c:noMultiLvlLbl val="0"/>
       </c:catAx>
       <c:valAx>
-        <c:axId val="900701456"/>
+        <c:axId val="577663616"/>
         <c:scaling>
           <c:orientation val="minMax"/>
         </c:scaling>
@@ -505,7 +505,7 @@
             <a:endParaRPr lang="en-US"/>
           </a:p>
         </c:txPr>
-        <c:crossAx val="816000496"/>
+        <c:crossAx val="657476528"/>
         <c:crosses val="autoZero"/>
         <c:crossBetween val="between"/>
       </c:valAx>
@@ -1157,7 +1157,7 @@
           <a:p>
             <a:fld id="{2DC631C1-44AE-2E4D-A925-044A06DA3E6D}" type="datetimeFigureOut">
               <a:rPr lang="en-US" smtClean="0"/>
-              <a:t>8/25/16</a:t>
+              <a:t>9/24/16</a:t>
             </a:fld>
             <a:endParaRPr lang="en-US"/>
           </a:p>
@@ -1808,7 +1808,7 @@
           <a:p>
             <a:fld id="{35870F1A-7F8A-F14D-819A-8F66C693C7C4}" type="datetimeFigureOut">
               <a:rPr lang="en-US" smtClean="0"/>
-              <a:t>8/25/16</a:t>
+              <a:t>9/24/16</a:t>
             </a:fld>
             <a:endParaRPr lang="en-US"/>
           </a:p>
@@ -1978,7 +1978,7 @@
           <a:p>
             <a:fld id="{35870F1A-7F8A-F14D-819A-8F66C693C7C4}" type="datetimeFigureOut">
               <a:rPr lang="en-US" smtClean="0"/>
-              <a:t>8/25/16</a:t>
+              <a:t>9/24/16</a:t>
             </a:fld>
             <a:endParaRPr lang="en-US"/>
           </a:p>
@@ -2158,7 +2158,7 @@
           <a:p>
             <a:fld id="{35870F1A-7F8A-F14D-819A-8F66C693C7C4}" type="datetimeFigureOut">
               <a:rPr lang="en-US" smtClean="0"/>
-              <a:t>8/25/16</a:t>
+              <a:t>9/24/16</a:t>
             </a:fld>
             <a:endParaRPr lang="en-US"/>
           </a:p>
@@ -2328,7 +2328,7 @@
           <a:p>
             <a:fld id="{35870F1A-7F8A-F14D-819A-8F66C693C7C4}" type="datetimeFigureOut">
               <a:rPr lang="en-US" smtClean="0"/>
-              <a:t>8/25/16</a:t>
+              <a:t>9/24/16</a:t>
             </a:fld>
             <a:endParaRPr lang="en-US"/>
           </a:p>
@@ -2574,7 +2574,7 @@
           <a:p>
             <a:fld id="{35870F1A-7F8A-F14D-819A-8F66C693C7C4}" type="datetimeFigureOut">
               <a:rPr lang="en-US" smtClean="0"/>
-              <a:t>8/25/16</a:t>
+              <a:t>9/24/16</a:t>
             </a:fld>
             <a:endParaRPr lang="en-US"/>
           </a:p>
@@ -2806,7 +2806,7 @@
           <a:p>
             <a:fld id="{35870F1A-7F8A-F14D-819A-8F66C693C7C4}" type="datetimeFigureOut">
               <a:rPr lang="en-US" smtClean="0"/>
-              <a:t>8/25/16</a:t>
+              <a:t>9/24/16</a:t>
             </a:fld>
             <a:endParaRPr lang="en-US"/>
           </a:p>
@@ -3173,7 +3173,7 @@
           <a:p>
             <a:fld id="{35870F1A-7F8A-F14D-819A-8F66C693C7C4}" type="datetimeFigureOut">
               <a:rPr lang="en-US" smtClean="0"/>
-              <a:t>8/25/16</a:t>
+              <a:t>9/24/16</a:t>
             </a:fld>
             <a:endParaRPr lang="en-US"/>
           </a:p>
@@ -3291,7 +3291,7 @@
           <a:p>
             <a:fld id="{35870F1A-7F8A-F14D-819A-8F66C693C7C4}" type="datetimeFigureOut">
               <a:rPr lang="en-US" smtClean="0"/>
-              <a:t>8/25/16</a:t>
+              <a:t>9/24/16</a:t>
             </a:fld>
             <a:endParaRPr lang="en-US"/>
           </a:p>
@@ -3386,7 +3386,7 @@
           <a:p>
             <a:fld id="{35870F1A-7F8A-F14D-819A-8F66C693C7C4}" type="datetimeFigureOut">
               <a:rPr lang="en-US" smtClean="0"/>
-              <a:t>8/25/16</a:t>
+              <a:t>9/24/16</a:t>
             </a:fld>
             <a:endParaRPr lang="en-US"/>
           </a:p>
@@ -3663,7 +3663,7 @@
           <a:p>
             <a:fld id="{35870F1A-7F8A-F14D-819A-8F66C693C7C4}" type="datetimeFigureOut">
               <a:rPr lang="en-US" smtClean="0"/>
-              <a:t>8/25/16</a:t>
+              <a:t>9/24/16</a:t>
             </a:fld>
             <a:endParaRPr lang="en-US"/>
           </a:p>
@@ -3916,7 +3916,7 @@
           <a:p>
             <a:fld id="{35870F1A-7F8A-F14D-819A-8F66C693C7C4}" type="datetimeFigureOut">
               <a:rPr lang="en-US" smtClean="0"/>
-              <a:t>8/25/16</a:t>
+              <a:t>9/24/16</a:t>
             </a:fld>
             <a:endParaRPr lang="en-US"/>
           </a:p>
@@ -4129,7 +4129,7 @@
           <a:p>
             <a:fld id="{35870F1A-7F8A-F14D-819A-8F66C693C7C4}" type="datetimeFigureOut">
               <a:rPr lang="en-US" smtClean="0"/>
-              <a:t>8/25/16</a:t>
+              <a:t>9/24/16</a:t>
             </a:fld>
             <a:endParaRPr lang="en-US"/>
           </a:p>

</xml_diff>